<commit_message>
chore(auth): migrate to next-auth v5 (auth.ts handlers + AUTH_ env)
</commit_message>
<xml_diff>
--- a/진행상황.pptx
+++ b/진행상황.pptx
@@ -9765,6 +9765,1257 @@
           <a:chExt cx="0" cy="0"/>
         </a:xfrm>
       </p:grpSpPr>
+      <p:sp>
+        <p:nvSpPr>
+          <p:cNvPr id="9" name="TextBox 8">
+            <a:extLst>
+              <a:ext uri="{FF2B5EF4-FFF2-40B4-BE49-F238E27FC236}">
+                <a16:creationId xmlns:a16="http://schemas.microsoft.com/office/drawing/2014/main" id="{66CCFDBD-1DAF-8EC8-D46E-4306FD903B58}"/>
+              </a:ext>
+            </a:extLst>
+          </p:cNvPr>
+          <p:cNvSpPr txBox="1"/>
+          <p:nvPr/>
+        </p:nvSpPr>
+        <p:spPr>
+          <a:xfrm>
+            <a:off x="0" y="1752123"/>
+            <a:ext cx="6324600" cy="6401753"/>
+          </a:xfrm>
+          <a:prstGeom prst="rect">
+            <a:avLst/>
+          </a:prstGeom>
+          <a:noFill/>
+        </p:spPr>
+        <p:txBody>
+          <a:bodyPr wrap="square">
+            <a:spAutoFit/>
+          </a:bodyPr>
+          <a:lstStyle/>
+          <a:p>
+            <a:pPr>
+              <a:buNone/>
+            </a:pPr>
+            <a:r>
+              <a:rPr lang="ko-KR" altLang="en-US" sz="1000" b="1" dirty="0"/>
+              <a:t>권장 운영 방식</a:t>
+            </a:r>
+            <a:r>
+              <a:rPr lang="en-US" altLang="ko-KR" sz="1000" b="1" dirty="0"/>
+              <a:t>(</a:t>
+            </a:r>
+            <a:r>
+              <a:rPr lang="ko-KR" altLang="en-US" sz="1000" b="1" dirty="0"/>
+              <a:t>요약</a:t>
+            </a:r>
+            <a:r>
+              <a:rPr lang="en-US" altLang="ko-KR" sz="1000" b="1" dirty="0"/>
+              <a:t>)</a:t>
+            </a:r>
+          </a:p>
+          <a:p>
+            <a:pPr>
+              <a:buFont typeface="+mj-lt"/>
+              <a:buAutoNum type="arabicPeriod"/>
+            </a:pPr>
+            <a:r>
+              <a:rPr lang="ko-KR" altLang="en-US" sz="1000" b="1" dirty="0"/>
+              <a:t>자주</a:t>
+            </a:r>
+            <a:r>
+              <a:rPr lang="en-US" altLang="ko-KR" sz="1000" b="1" dirty="0"/>
+              <a:t>, </a:t>
+            </a:r>
+            <a:r>
+              <a:rPr lang="ko-KR" altLang="en-US" sz="1000" b="1" dirty="0"/>
+              <a:t>작게 </a:t>
+            </a:r>
+            <a:r>
+              <a:rPr lang="ko-KR" altLang="en-US" sz="1000" b="1" dirty="0" err="1"/>
+              <a:t>커밋</a:t>
+            </a:r>
+            <a:endParaRPr lang="ko-KR" altLang="en-US" sz="1000" dirty="0"/>
+          </a:p>
+          <a:p>
+            <a:pPr marL="742950" lvl="1" indent="-285750">
+              <a:buFont typeface="+mj-lt"/>
+              <a:buAutoNum type="arabicPeriod"/>
+            </a:pPr>
+            <a:r>
+              <a:rPr lang="ko-KR" altLang="en-US" sz="1000" dirty="0"/>
+              <a:t>의미 있는 변경마다 </a:t>
+            </a:r>
+            <a:r>
+              <a:rPr lang="en-US" altLang="ko-KR" sz="1000" dirty="0">
+                <a:latin typeface="Courier New" panose="02070309020205020404" pitchFamily="49" charset="0"/>
+              </a:rPr>
+              <a:t>git add -A &amp;&amp; git commit -m "feat: …"</a:t>
+            </a:r>
+            <a:endParaRPr lang="ko-KR" altLang="en-US" sz="1000" dirty="0"/>
+          </a:p>
+          <a:p>
+            <a:pPr marL="742950" lvl="1" indent="-285750">
+              <a:buFont typeface="+mj-lt"/>
+              <a:buAutoNum type="arabicPeriod"/>
+            </a:pPr>
+            <a:r>
+              <a:rPr lang="ko-KR" altLang="en-US" sz="1000" dirty="0" err="1"/>
+              <a:t>커밋이</a:t>
+            </a:r>
+            <a:r>
+              <a:rPr lang="ko-KR" altLang="en-US" sz="1000" dirty="0"/>
+              <a:t> 곧 복구 지점입니다</a:t>
+            </a:r>
+            <a:r>
+              <a:rPr lang="en-US" altLang="ko-KR" sz="1000" dirty="0"/>
+              <a:t>.</a:t>
+            </a:r>
+          </a:p>
+          <a:p>
+            <a:pPr>
+              <a:buFont typeface="+mj-lt"/>
+              <a:buAutoNum type="arabicPeriod"/>
+            </a:pPr>
+            <a:r>
+              <a:rPr lang="ko-KR" altLang="en-US" sz="1000" b="1" dirty="0" err="1"/>
+              <a:t>브랜치로</a:t>
+            </a:r>
+            <a:r>
+              <a:rPr lang="ko-KR" altLang="en-US" sz="1000" b="1" dirty="0"/>
+              <a:t> 실험 </a:t>
+            </a:r>
+            <a:r>
+              <a:rPr lang="en-US" altLang="ko-KR" sz="1000" b="1" dirty="0"/>
+              <a:t>/ main</a:t>
+            </a:r>
+            <a:r>
+              <a:rPr lang="ko-KR" altLang="en-US" sz="1000" b="1" dirty="0"/>
+              <a:t>은 안정</a:t>
+            </a:r>
+            <a:endParaRPr lang="ko-KR" altLang="en-US" sz="1000" dirty="0"/>
+          </a:p>
+          <a:p>
+            <a:pPr marL="742950" lvl="1" indent="-285750">
+              <a:buFont typeface="+mj-lt"/>
+              <a:buAutoNum type="arabicPeriod"/>
+            </a:pPr>
+            <a:r>
+              <a:rPr lang="ko-KR" altLang="en-US" sz="1000" dirty="0"/>
+              <a:t>작업</a:t>
+            </a:r>
+            <a:r>
+              <a:rPr lang="en-US" altLang="ko-KR" sz="1000" dirty="0"/>
+              <a:t>: </a:t>
+            </a:r>
+            <a:r>
+              <a:rPr lang="en-US" altLang="ko-KR" sz="1000" dirty="0">
+                <a:latin typeface="Courier New" panose="02070309020205020404" pitchFamily="49" charset="0"/>
+              </a:rPr>
+              <a:t>git checkout -b feature/…</a:t>
+            </a:r>
+            <a:endParaRPr lang="ko-KR" altLang="en-US" sz="1000" dirty="0"/>
+          </a:p>
+          <a:p>
+            <a:pPr marL="742950" lvl="1" indent="-285750">
+              <a:buFont typeface="+mj-lt"/>
+              <a:buAutoNum type="arabicPeriod"/>
+            </a:pPr>
+            <a:r>
+              <a:rPr lang="ko-KR" altLang="en-US" sz="1000" dirty="0"/>
+              <a:t>완료 후 </a:t>
+            </a:r>
+            <a:r>
+              <a:rPr lang="en-US" altLang="ko-KR" sz="1000" dirty="0"/>
+              <a:t>PR</a:t>
+            </a:r>
+            <a:r>
+              <a:rPr lang="ko-KR" altLang="en-US" sz="1000" dirty="0"/>
+              <a:t>로 </a:t>
+            </a:r>
+            <a:r>
+              <a:rPr lang="en-US" altLang="ko-KR" sz="1000" dirty="0"/>
+              <a:t>main</a:t>
+            </a:r>
+            <a:r>
+              <a:rPr lang="ko-KR" altLang="en-US" sz="1000" dirty="0"/>
+              <a:t>에 병합</a:t>
+            </a:r>
+          </a:p>
+          <a:p>
+            <a:pPr marL="742950" lvl="1" indent="-285750">
+              <a:buFont typeface="+mj-lt"/>
+              <a:buAutoNum type="arabicPeriod"/>
+            </a:pPr>
+            <a:r>
+              <a:rPr lang="ko-KR" altLang="en-US" sz="1000" dirty="0"/>
+              <a:t>망치면 </a:t>
+            </a:r>
+            <a:r>
+              <a:rPr lang="ko-KR" altLang="en-US" sz="1000" dirty="0" err="1"/>
+              <a:t>브랜치</a:t>
+            </a:r>
+            <a:r>
+              <a:rPr lang="ko-KR" altLang="en-US" sz="1000" dirty="0"/>
+              <a:t> 폐기만 하면 됩니다</a:t>
+            </a:r>
+            <a:r>
+              <a:rPr lang="en-US" altLang="ko-KR" sz="1000" dirty="0"/>
+              <a:t>.</a:t>
+            </a:r>
+          </a:p>
+          <a:p>
+            <a:pPr>
+              <a:buFont typeface="+mj-lt"/>
+              <a:buAutoNum type="arabicPeriod"/>
+            </a:pPr>
+            <a:r>
+              <a:rPr lang="ko-KR" altLang="en-US" sz="1000" b="1" dirty="0"/>
+              <a:t>태그</a:t>
+            </a:r>
+            <a:r>
+              <a:rPr lang="en-US" altLang="ko-KR" sz="1000" b="1" dirty="0"/>
+              <a:t>/</a:t>
+            </a:r>
+            <a:r>
+              <a:rPr lang="ko-KR" altLang="en-US" sz="1000" b="1" dirty="0"/>
+              <a:t>릴리즈로 큰 이정표 고정</a:t>
+            </a:r>
+            <a:endParaRPr lang="ko-KR" altLang="en-US" sz="1000" dirty="0"/>
+          </a:p>
+          <a:p>
+            <a:pPr rtl="0">
+              <a:buFont typeface="+mj-lt"/>
+              <a:buAutoNum type="arabicPeriod"/>
+            </a:pPr>
+            <a:r>
+              <a:rPr lang="en-US" altLang="ko-KR" sz="1000" dirty="0">
+                <a:latin typeface="Courier New" panose="02070309020205020404" pitchFamily="49" charset="0"/>
+              </a:rPr>
+              <a:t>git tag -a v0.2.0 -m "OOFF v0.2.0"</a:t>
+            </a:r>
+          </a:p>
+          <a:p>
+            <a:pPr rtl="0">
+              <a:buFont typeface="+mj-lt"/>
+              <a:buAutoNum type="arabicPeriod"/>
+            </a:pPr>
+            <a:r>
+              <a:rPr lang="en-US" altLang="ko-KR" sz="1000" dirty="0">
+                <a:latin typeface="Courier New" panose="02070309020205020404" pitchFamily="49" charset="0"/>
+              </a:rPr>
+              <a:t>git push --tags</a:t>
+            </a:r>
+          </a:p>
+          <a:p>
+            <a:pPr marL="742950" lvl="1" indent="-285750">
+              <a:buFont typeface="+mj-lt"/>
+              <a:buAutoNum type="arabicPeriod"/>
+            </a:pPr>
+            <a:r>
+              <a:rPr lang="ko-KR" altLang="en-US" sz="1000" dirty="0"/>
+              <a:t>이 태그 </a:t>
+            </a:r>
+            <a:r>
+              <a:rPr lang="ko-KR" altLang="en-US" sz="1000" dirty="0" err="1"/>
+              <a:t>커밋으로</a:t>
+            </a:r>
+            <a:r>
+              <a:rPr lang="ko-KR" altLang="en-US" sz="1000" dirty="0"/>
+              <a:t> 언제든 복귀 가능</a:t>
+            </a:r>
+            <a:r>
+              <a:rPr lang="en-US" altLang="ko-KR" sz="1000" dirty="0"/>
+              <a:t>. </a:t>
+            </a:r>
+            <a:r>
+              <a:rPr lang="en-US" altLang="ko-KR" sz="1000" dirty="0" err="1"/>
+              <a:t>Vercel</a:t>
+            </a:r>
+            <a:r>
+              <a:rPr lang="ko-KR" altLang="en-US" sz="1000" dirty="0"/>
+              <a:t>도 해당 </a:t>
+            </a:r>
+            <a:r>
+              <a:rPr lang="ko-KR" altLang="en-US" sz="1000" dirty="0" err="1"/>
+              <a:t>커밋으로</a:t>
+            </a:r>
+            <a:r>
+              <a:rPr lang="ko-KR" altLang="en-US" sz="1000" dirty="0"/>
+              <a:t> 롤백 가능</a:t>
+            </a:r>
+            <a:r>
+              <a:rPr lang="en-US" altLang="ko-KR" sz="1000" dirty="0"/>
+              <a:t>.</a:t>
+            </a:r>
+          </a:p>
+          <a:p>
+            <a:pPr>
+              <a:buFont typeface="+mj-lt"/>
+              <a:buAutoNum type="arabicPeriod"/>
+            </a:pPr>
+            <a:r>
+              <a:rPr lang="ko-KR" altLang="en-US" sz="1000" b="1" dirty="0"/>
+              <a:t>되돌리기 </a:t>
+            </a:r>
+            <a:r>
+              <a:rPr lang="en-US" altLang="ko-KR" sz="1000" b="1" dirty="0"/>
+              <a:t>3</a:t>
+            </a:r>
+            <a:r>
+              <a:rPr lang="ko-KR" altLang="en-US" sz="1000" b="1" dirty="0"/>
+              <a:t>형제</a:t>
+            </a:r>
+            <a:endParaRPr lang="ko-KR" altLang="en-US" sz="1000" dirty="0"/>
+          </a:p>
+          <a:p>
+            <a:pPr marL="742950" lvl="1" indent="-285750">
+              <a:buFont typeface="+mj-lt"/>
+              <a:buAutoNum type="arabicPeriod"/>
+            </a:pPr>
+            <a:r>
+              <a:rPr lang="ko-KR" altLang="en-US" sz="1000" dirty="0"/>
+              <a:t>특정 </a:t>
+            </a:r>
+            <a:r>
+              <a:rPr lang="ko-KR" altLang="en-US" sz="1000" dirty="0" err="1"/>
+              <a:t>커밋만</a:t>
+            </a:r>
+            <a:r>
+              <a:rPr lang="ko-KR" altLang="en-US" sz="1000" dirty="0"/>
+              <a:t> “되돌리는” 안전 롤백</a:t>
+            </a:r>
+            <a:r>
+              <a:rPr lang="en-US" altLang="ko-KR" sz="1000" dirty="0"/>
+              <a:t>(</a:t>
+            </a:r>
+            <a:r>
+              <a:rPr lang="ko-KR" altLang="en-US" sz="1000" dirty="0"/>
+              <a:t>히스토리 보존</a:t>
+            </a:r>
+            <a:r>
+              <a:rPr lang="en-US" altLang="ko-KR" sz="1000" dirty="0"/>
+              <a:t>):</a:t>
+            </a:r>
+          </a:p>
+          <a:p>
+            <a:pPr marL="742950" lvl="1" indent="-285750" rtl="0">
+              <a:buFont typeface="+mj-lt"/>
+              <a:buAutoNum type="arabicPeriod"/>
+            </a:pPr>
+            <a:r>
+              <a:rPr lang="en-US" altLang="ko-KR" sz="1000" dirty="0">
+                <a:latin typeface="Courier New" panose="02070309020205020404" pitchFamily="49" charset="0"/>
+              </a:rPr>
+              <a:t>git log --</a:t>
+            </a:r>
+            <a:r>
+              <a:rPr lang="en-US" altLang="ko-KR" sz="1000" dirty="0" err="1">
+                <a:latin typeface="Courier New" panose="02070309020205020404" pitchFamily="49" charset="0"/>
+              </a:rPr>
+              <a:t>oneline</a:t>
+            </a:r>
+            <a:r>
+              <a:rPr lang="en-US" altLang="ko-KR" sz="1000" dirty="0">
+                <a:latin typeface="Courier New" panose="02070309020205020404" pitchFamily="49" charset="0"/>
+              </a:rPr>
+              <a:t>    # </a:t>
+            </a:r>
+            <a:r>
+              <a:rPr lang="ko-KR" altLang="en-US" sz="1000" dirty="0">
+                <a:latin typeface="Courier New" panose="02070309020205020404" pitchFamily="49" charset="0"/>
+              </a:rPr>
+              <a:t>대상 </a:t>
+            </a:r>
+            <a:r>
+              <a:rPr lang="ko-KR" altLang="en-US" sz="1000" dirty="0" err="1">
+                <a:latin typeface="Courier New" panose="02070309020205020404" pitchFamily="49" charset="0"/>
+              </a:rPr>
+              <a:t>커밋</a:t>
+            </a:r>
+            <a:r>
+              <a:rPr lang="ko-KR" altLang="en-US" sz="1000" dirty="0">
+                <a:latin typeface="Courier New" panose="02070309020205020404" pitchFamily="49" charset="0"/>
+              </a:rPr>
+              <a:t> 찾기</a:t>
+            </a:r>
+          </a:p>
+          <a:p>
+            <a:pPr marL="742950" lvl="1" indent="-285750" rtl="0">
+              <a:buFont typeface="+mj-lt"/>
+              <a:buAutoNum type="arabicPeriod"/>
+            </a:pPr>
+            <a:r>
+              <a:rPr lang="en-US" altLang="ko-KR" sz="1000" dirty="0">
+                <a:latin typeface="Courier New" panose="02070309020205020404" pitchFamily="49" charset="0"/>
+              </a:rPr>
+              <a:t>git revert &lt;commit&gt;</a:t>
+            </a:r>
+          </a:p>
+          <a:p>
+            <a:pPr marL="742950" lvl="1" indent="-285750" rtl="0">
+              <a:buFont typeface="+mj-lt"/>
+              <a:buAutoNum type="arabicPeriod"/>
+            </a:pPr>
+            <a:r>
+              <a:rPr lang="en-US" altLang="ko-KR" sz="1000" dirty="0">
+                <a:latin typeface="Courier New" panose="02070309020205020404" pitchFamily="49" charset="0"/>
+              </a:rPr>
+              <a:t>git push</a:t>
+            </a:r>
+          </a:p>
+          <a:p>
+            <a:pPr marL="742950" lvl="1" indent="-285750">
+              <a:buFont typeface="+mj-lt"/>
+              <a:buAutoNum type="arabicPeriod"/>
+            </a:pPr>
+            <a:r>
+              <a:rPr lang="ko-KR" altLang="en-US" sz="1000" dirty="0"/>
+              <a:t>과감히 과거 </a:t>
+            </a:r>
+            <a:r>
+              <a:rPr lang="ko-KR" altLang="en-US" sz="1000" dirty="0" err="1"/>
+              <a:t>스냅샷로</a:t>
+            </a:r>
+            <a:r>
+              <a:rPr lang="ko-KR" altLang="en-US" sz="1000" dirty="0"/>
+              <a:t> 통째로 돌아가기</a:t>
+            </a:r>
+            <a:r>
+              <a:rPr lang="en-US" altLang="ko-KR" sz="1000" dirty="0"/>
+              <a:t>(</a:t>
+            </a:r>
+            <a:r>
+              <a:rPr lang="ko-KR" altLang="en-US" sz="1000" dirty="0"/>
+              <a:t>로컬 강제</a:t>
+            </a:r>
+            <a:r>
+              <a:rPr lang="en-US" altLang="ko-KR" sz="1000" dirty="0"/>
+              <a:t>):</a:t>
+            </a:r>
+          </a:p>
+          <a:p>
+            <a:pPr marL="742950" lvl="1" indent="-285750" rtl="0">
+              <a:buFont typeface="+mj-lt"/>
+              <a:buAutoNum type="arabicPeriod"/>
+            </a:pPr>
+            <a:r>
+              <a:rPr lang="en-US" altLang="ko-KR" sz="1000" dirty="0">
+                <a:latin typeface="Courier New" panose="02070309020205020404" pitchFamily="49" charset="0"/>
+              </a:rPr>
+              <a:t>git reset --hard &lt;commit&gt;</a:t>
+            </a:r>
+          </a:p>
+          <a:p>
+            <a:pPr marL="742950" lvl="1" indent="-285750" rtl="0">
+              <a:buFont typeface="+mj-lt"/>
+              <a:buAutoNum type="arabicPeriod"/>
+            </a:pPr>
+            <a:r>
+              <a:rPr lang="en-US" altLang="ko-KR" sz="1000" dirty="0">
+                <a:latin typeface="Courier New" panose="02070309020205020404" pitchFamily="49" charset="0"/>
+              </a:rPr>
+              <a:t>git push --force     # </a:t>
+            </a:r>
+            <a:r>
+              <a:rPr lang="ko-KR" altLang="en-US" sz="1000" dirty="0">
+                <a:latin typeface="Courier New" panose="02070309020205020404" pitchFamily="49" charset="0"/>
+              </a:rPr>
+              <a:t>주의</a:t>
+            </a:r>
+            <a:r>
+              <a:rPr lang="en-US" altLang="ko-KR" sz="1000" dirty="0">
+                <a:latin typeface="Courier New" panose="02070309020205020404" pitchFamily="49" charset="0"/>
+              </a:rPr>
+              <a:t>: </a:t>
+            </a:r>
+            <a:r>
+              <a:rPr lang="ko-KR" altLang="en-US" sz="1000" dirty="0">
+                <a:latin typeface="Courier New" panose="02070309020205020404" pitchFamily="49" charset="0"/>
+              </a:rPr>
+              <a:t>협업 중이면 상의 필수</a:t>
+            </a:r>
+          </a:p>
+          <a:p>
+            <a:pPr marL="742950" lvl="1" indent="-285750">
+              <a:buFont typeface="+mj-lt"/>
+              <a:buAutoNum type="arabicPeriod"/>
+            </a:pPr>
+            <a:r>
+              <a:rPr lang="ko-KR" altLang="en-US" sz="1000" dirty="0"/>
+              <a:t>예전 스냅샷에서 </a:t>
+            </a:r>
+            <a:r>
+              <a:rPr lang="ko-KR" altLang="en-US" sz="1000" dirty="0" err="1"/>
+              <a:t>핫픽스</a:t>
+            </a:r>
+            <a:r>
+              <a:rPr lang="ko-KR" altLang="en-US" sz="1000" dirty="0"/>
+              <a:t> </a:t>
+            </a:r>
+            <a:r>
+              <a:rPr lang="ko-KR" altLang="en-US" sz="1000" dirty="0" err="1"/>
+              <a:t>브랜치</a:t>
+            </a:r>
+            <a:r>
+              <a:rPr lang="ko-KR" altLang="en-US" sz="1000" dirty="0"/>
+              <a:t> 파서 수정</a:t>
+            </a:r>
+            <a:r>
+              <a:rPr lang="en-US" altLang="ko-KR" sz="1000" dirty="0"/>
+              <a:t>:</a:t>
+            </a:r>
+          </a:p>
+          <a:p>
+            <a:pPr marL="742950" lvl="1" indent="-285750" rtl="0">
+              <a:buFont typeface="+mj-lt"/>
+              <a:buAutoNum type="arabicPeriod"/>
+            </a:pPr>
+            <a:r>
+              <a:rPr lang="en-US" altLang="ko-KR" sz="1000" dirty="0">
+                <a:latin typeface="Courier New" panose="02070309020205020404" pitchFamily="49" charset="0"/>
+              </a:rPr>
+              <a:t>git checkout -b hotfix/from-v0.2.0 &lt;tag-or-commit&gt;</a:t>
+            </a:r>
+          </a:p>
+          <a:p>
+            <a:pPr>
+              <a:buFont typeface="+mj-lt"/>
+              <a:buAutoNum type="arabicPeriod"/>
+            </a:pPr>
+            <a:r>
+              <a:rPr lang="en-US" altLang="ko-KR" sz="1000" b="1" dirty="0"/>
+              <a:t>GitHub + </a:t>
+            </a:r>
+            <a:r>
+              <a:rPr lang="en-US" altLang="ko-KR" sz="1000" b="1" dirty="0" err="1"/>
+              <a:t>Vercel</a:t>
+            </a:r>
+            <a:r>
+              <a:rPr lang="en-US" altLang="ko-KR" sz="1000" b="1" dirty="0"/>
+              <a:t> </a:t>
+            </a:r>
+            <a:r>
+              <a:rPr lang="ko-KR" altLang="en-US" sz="1000" b="1" dirty="0"/>
+              <a:t>롤백</a:t>
+            </a:r>
+            <a:endParaRPr lang="ko-KR" altLang="en-US" sz="1000" dirty="0"/>
+          </a:p>
+          <a:p>
+            <a:pPr marL="742950" lvl="1" indent="-285750">
+              <a:buFont typeface="+mj-lt"/>
+              <a:buAutoNum type="arabicPeriod"/>
+            </a:pPr>
+            <a:r>
+              <a:rPr lang="en-US" altLang="ko-KR" sz="1000" dirty="0"/>
+              <a:t>GitHub: </a:t>
+            </a:r>
+            <a:r>
+              <a:rPr lang="ko-KR" altLang="en-US" sz="1000" dirty="0"/>
+              <a:t>이전 </a:t>
+            </a:r>
+            <a:r>
+              <a:rPr lang="ko-KR" altLang="en-US" sz="1000" dirty="0" err="1"/>
+              <a:t>커밋</a:t>
+            </a:r>
+            <a:r>
+              <a:rPr lang="en-US" altLang="ko-KR" sz="1000" dirty="0"/>
+              <a:t>/</a:t>
+            </a:r>
+            <a:r>
+              <a:rPr lang="ko-KR" altLang="en-US" sz="1000" dirty="0"/>
+              <a:t>태그로 </a:t>
+            </a:r>
+            <a:r>
+              <a:rPr lang="en-US" altLang="ko-KR" sz="1000" dirty="0"/>
+              <a:t>PR </a:t>
+            </a:r>
+            <a:r>
+              <a:rPr lang="ko-KR" altLang="en-US" sz="1000" dirty="0"/>
+              <a:t>생성 → </a:t>
+            </a:r>
+            <a:r>
+              <a:rPr lang="ko-KR" altLang="en-US" sz="1000" dirty="0" err="1"/>
+              <a:t>머지</a:t>
+            </a:r>
+            <a:endParaRPr lang="ko-KR" altLang="en-US" sz="1000" dirty="0"/>
+          </a:p>
+          <a:p>
+            <a:pPr marL="742950" lvl="1" indent="-285750">
+              <a:buFont typeface="+mj-lt"/>
+              <a:buAutoNum type="arabicPeriod"/>
+            </a:pPr>
+            <a:r>
+              <a:rPr lang="en-US" altLang="ko-KR" sz="1000" dirty="0" err="1"/>
+              <a:t>Vercel</a:t>
+            </a:r>
+            <a:r>
+              <a:rPr lang="en-US" altLang="ko-KR" sz="1000" dirty="0"/>
+              <a:t>: Deployments</a:t>
+            </a:r>
+            <a:r>
+              <a:rPr lang="ko-KR" altLang="en-US" sz="1000" dirty="0"/>
+              <a:t>에서 </a:t>
+            </a:r>
+            <a:r>
+              <a:rPr lang="ko-KR" altLang="en-US" sz="1000" b="1" dirty="0"/>
+              <a:t>이전 배포 → </a:t>
+            </a:r>
+            <a:r>
+              <a:rPr lang="en-US" altLang="ko-KR" sz="1000" b="1" dirty="0"/>
+              <a:t>Redeploy</a:t>
+            </a:r>
+            <a:r>
+              <a:rPr lang="ko-KR" altLang="en-US" sz="1000" dirty="0"/>
+              <a:t> 버튼으로 즉시 원복</a:t>
+            </a:r>
+          </a:p>
+          <a:p>
+            <a:pPr>
+              <a:buFont typeface="+mj-lt"/>
+              <a:buAutoNum type="arabicPeriod"/>
+            </a:pPr>
+            <a:r>
+              <a:rPr lang="ko-KR" altLang="en-US" sz="1000" b="1" dirty="0"/>
+              <a:t>백업</a:t>
+            </a:r>
+            <a:r>
+              <a:rPr lang="en-US" altLang="ko-KR" sz="1000" b="1" dirty="0"/>
+              <a:t>/</a:t>
+            </a:r>
+            <a:r>
+              <a:rPr lang="ko-KR" altLang="en-US" sz="1000" b="1" dirty="0"/>
+              <a:t>안전 장치</a:t>
+            </a:r>
+            <a:endParaRPr lang="ko-KR" altLang="en-US" sz="1000" dirty="0"/>
+          </a:p>
+          <a:p>
+            <a:pPr marL="742950" lvl="1" indent="-285750">
+              <a:buFont typeface="+mj-lt"/>
+              <a:buAutoNum type="arabicPeriod"/>
+            </a:pPr>
+            <a:r>
+              <a:rPr lang="en-US" altLang="ko-KR" sz="1000" dirty="0"/>
+              <a:t>GitHub </a:t>
+            </a:r>
+            <a:r>
+              <a:rPr lang="ko-KR" altLang="en-US" sz="1000" dirty="0"/>
+              <a:t>원격이 </a:t>
+            </a:r>
+            <a:r>
+              <a:rPr lang="en-US" altLang="ko-KR" sz="1000" dirty="0"/>
+              <a:t>1</a:t>
+            </a:r>
+            <a:r>
+              <a:rPr lang="ko-KR" altLang="en-US" sz="1000" dirty="0"/>
+              <a:t>차 백업입니다</a:t>
+            </a:r>
+            <a:r>
+              <a:rPr lang="en-US" altLang="ko-KR" sz="1000" dirty="0"/>
+              <a:t>. </a:t>
+            </a:r>
+            <a:r>
+              <a:rPr lang="ko-KR" altLang="en-US" sz="1000" dirty="0"/>
+              <a:t>원하시면 </a:t>
+            </a:r>
+            <a:r>
+              <a:rPr lang="ko-KR" altLang="en-US" sz="1000" b="1" dirty="0"/>
+              <a:t>미러 원격</a:t>
+            </a:r>
+            <a:r>
+              <a:rPr lang="ko-KR" altLang="en-US" sz="1000" dirty="0"/>
+              <a:t>도 추가</a:t>
+            </a:r>
+            <a:r>
+              <a:rPr lang="en-US" altLang="ko-KR" sz="1000" dirty="0"/>
+              <a:t>:</a:t>
+            </a:r>
+          </a:p>
+          <a:p>
+            <a:pPr marL="742950" lvl="1" indent="-285750" rtl="0">
+              <a:buFont typeface="+mj-lt"/>
+              <a:buAutoNum type="arabicPeriod"/>
+            </a:pPr>
+            <a:r>
+              <a:rPr lang="en-US" altLang="ko-KR" sz="1000" dirty="0">
+                <a:latin typeface="Courier New" panose="02070309020205020404" pitchFamily="49" charset="0"/>
+              </a:rPr>
+              <a:t>git remote add backup &lt;</a:t>
+            </a:r>
+            <a:r>
+              <a:rPr lang="ko-KR" altLang="en-US" sz="1000" dirty="0">
+                <a:latin typeface="Courier New" panose="02070309020205020404" pitchFamily="49" charset="0"/>
+              </a:rPr>
+              <a:t>다른</a:t>
+            </a:r>
+            <a:r>
+              <a:rPr lang="en-US" altLang="ko-KR" sz="1000" dirty="0">
+                <a:latin typeface="Courier New" panose="02070309020205020404" pitchFamily="49" charset="0"/>
+              </a:rPr>
+              <a:t>-</a:t>
+            </a:r>
+            <a:r>
+              <a:rPr lang="ko-KR" altLang="en-US" sz="1000" dirty="0">
+                <a:latin typeface="Courier New" panose="02070309020205020404" pitchFamily="49" charset="0"/>
+              </a:rPr>
+              <a:t>원격</a:t>
+            </a:r>
+            <a:r>
+              <a:rPr lang="en-US" altLang="ko-KR" sz="1000" dirty="0">
+                <a:latin typeface="Courier New" panose="02070309020205020404" pitchFamily="49" charset="0"/>
+              </a:rPr>
+              <a:t>-URL&gt;</a:t>
+            </a:r>
+          </a:p>
+          <a:p>
+            <a:pPr marL="742950" lvl="1" indent="-285750" rtl="0">
+              <a:buFont typeface="+mj-lt"/>
+              <a:buAutoNum type="arabicPeriod"/>
+            </a:pPr>
+            <a:r>
+              <a:rPr lang="en-US" altLang="ko-KR" sz="1000" dirty="0">
+                <a:latin typeface="Courier New" panose="02070309020205020404" pitchFamily="49" charset="0"/>
+              </a:rPr>
+              <a:t>git push backup --all</a:t>
+            </a:r>
+          </a:p>
+          <a:p>
+            <a:pPr marL="742950" lvl="1" indent="-285750" rtl="0">
+              <a:buFont typeface="+mj-lt"/>
+              <a:buAutoNum type="arabicPeriod"/>
+            </a:pPr>
+            <a:r>
+              <a:rPr lang="en-US" altLang="ko-KR" sz="1000" dirty="0">
+                <a:latin typeface="Courier New" panose="02070309020205020404" pitchFamily="49" charset="0"/>
+              </a:rPr>
+              <a:t>git push backup --tags</a:t>
+            </a:r>
+          </a:p>
+          <a:p>
+            <a:pPr marL="742950" lvl="1" indent="-285750">
+              <a:buFont typeface="+mj-lt"/>
+              <a:buAutoNum type="arabicPeriod"/>
+            </a:pPr>
+            <a:r>
+              <a:rPr lang="en-US" altLang="ko-KR" sz="1000" dirty="0">
+                <a:latin typeface="Courier New" panose="02070309020205020404" pitchFamily="49" charset="0"/>
+              </a:rPr>
+              <a:t>branch protection</a:t>
+            </a:r>
+            <a:r>
+              <a:rPr lang="ko-KR" altLang="en-US" sz="1000" dirty="0"/>
+              <a:t>으로 </a:t>
+            </a:r>
+            <a:r>
+              <a:rPr lang="en-US" altLang="ko-KR" sz="1000" dirty="0">
+                <a:latin typeface="Courier New" panose="02070309020205020404" pitchFamily="49" charset="0"/>
+              </a:rPr>
+              <a:t>main</a:t>
+            </a:r>
+            <a:r>
+              <a:rPr lang="ko-KR" altLang="en-US" sz="1000" dirty="0"/>
+              <a:t>에 </a:t>
+            </a:r>
+            <a:r>
+              <a:rPr lang="en-US" altLang="ko-KR" sz="1000" b="1" dirty="0"/>
+              <a:t>force-push </a:t>
+            </a:r>
+            <a:r>
+              <a:rPr lang="ko-KR" altLang="en-US" sz="1000" b="1" dirty="0"/>
+              <a:t>방지</a:t>
+            </a:r>
+            <a:r>
+              <a:rPr lang="en-US" altLang="ko-KR" sz="1000" dirty="0"/>
+              <a:t>, PR </a:t>
+            </a:r>
+            <a:r>
+              <a:rPr lang="ko-KR" altLang="en-US" sz="1000" dirty="0"/>
+              <a:t>필수화</a:t>
+            </a:r>
+          </a:p>
+          <a:p>
+            <a:pPr marL="742950" lvl="1" indent="-285750">
+              <a:buFont typeface="+mj-lt"/>
+              <a:buAutoNum type="arabicPeriod"/>
+            </a:pPr>
+            <a:r>
+              <a:rPr lang="en-US" altLang="ko-KR" sz="1000" dirty="0">
+                <a:latin typeface="Courier New" panose="02070309020205020404" pitchFamily="49" charset="0"/>
+              </a:rPr>
+              <a:t>.</a:t>
+            </a:r>
+            <a:r>
+              <a:rPr lang="en-US" altLang="ko-KR" sz="1000" dirty="0" err="1">
+                <a:latin typeface="Courier New" panose="02070309020205020404" pitchFamily="49" charset="0"/>
+              </a:rPr>
+              <a:t>gitignore</a:t>
+            </a:r>
+            <a:r>
+              <a:rPr lang="ko-KR" altLang="en-US" sz="1000" dirty="0"/>
+              <a:t>에 비밀</a:t>
+            </a:r>
+            <a:r>
+              <a:rPr lang="en-US" altLang="ko-KR" sz="1000" dirty="0"/>
+              <a:t>/</a:t>
+            </a:r>
+            <a:r>
+              <a:rPr lang="ko-KR" altLang="en-US" sz="1000" dirty="0"/>
+              <a:t>바이너리</a:t>
+            </a:r>
+            <a:r>
+              <a:rPr lang="en-US" altLang="ko-KR" sz="1000" dirty="0"/>
+              <a:t>(</a:t>
+            </a:r>
+            <a:r>
+              <a:rPr lang="ko-KR" altLang="en-US" sz="1000" dirty="0"/>
+              <a:t>예</a:t>
+            </a:r>
+            <a:r>
+              <a:rPr lang="en-US" altLang="ko-KR" sz="1000" dirty="0"/>
+              <a:t>: </a:t>
+            </a:r>
+            <a:r>
+              <a:rPr lang="en-US" altLang="ko-KR" sz="1000" dirty="0" err="1">
+                <a:latin typeface="Courier New" panose="02070309020205020404" pitchFamily="49" charset="0"/>
+              </a:rPr>
+              <a:t>dev.db</a:t>
+            </a:r>
+            <a:r>
+              <a:rPr lang="en-US" altLang="ko-KR" sz="1000" dirty="0"/>
+              <a:t>, </a:t>
+            </a:r>
+            <a:r>
+              <a:rPr lang="en-US" altLang="ko-KR" sz="1000" dirty="0">
+                <a:latin typeface="Courier New" panose="02070309020205020404" pitchFamily="49" charset="0"/>
+              </a:rPr>
+              <a:t>.env*</a:t>
+            </a:r>
+            <a:r>
+              <a:rPr lang="en-US" altLang="ko-KR" sz="1000" dirty="0"/>
+              <a:t>) </a:t>
+            </a:r>
+            <a:r>
+              <a:rPr lang="ko-KR" altLang="en-US" sz="1000" dirty="0"/>
+              <a:t>포함 유지</a:t>
+            </a:r>
+          </a:p>
+          <a:p>
+            <a:pPr marL="742950" lvl="1" indent="-285750">
+              <a:buFont typeface="+mj-lt"/>
+              <a:buAutoNum type="arabicPeriod"/>
+            </a:pPr>
+            <a:r>
+              <a:rPr lang="en-US" altLang="ko-KR" sz="1000" dirty="0"/>
+              <a:t>(</a:t>
+            </a:r>
+            <a:r>
+              <a:rPr lang="ko-KR" altLang="en-US" sz="1000" dirty="0"/>
+              <a:t>선택</a:t>
+            </a:r>
+            <a:r>
+              <a:rPr lang="en-US" altLang="ko-KR" sz="1000" dirty="0"/>
+              <a:t>) </a:t>
+            </a:r>
+            <a:r>
+              <a:rPr lang="en-US" altLang="ko-KR" sz="1000" dirty="0">
+                <a:latin typeface="Courier New" panose="02070309020205020404" pitchFamily="49" charset="0"/>
+              </a:rPr>
+              <a:t>.</a:t>
+            </a:r>
+            <a:r>
+              <a:rPr lang="en-US" altLang="ko-KR" sz="1000" dirty="0" err="1">
+                <a:latin typeface="Courier New" panose="02070309020205020404" pitchFamily="49" charset="0"/>
+              </a:rPr>
+              <a:t>gitattributes</a:t>
+            </a:r>
+            <a:r>
+              <a:rPr lang="ko-KR" altLang="en-US" sz="1000" dirty="0"/>
+              <a:t>로 </a:t>
+            </a:r>
+            <a:r>
+              <a:rPr lang="ko-KR" altLang="en-US" sz="1000" dirty="0" err="1"/>
+              <a:t>줄바꿈</a:t>
+            </a:r>
+            <a:r>
+              <a:rPr lang="ko-KR" altLang="en-US" sz="1000" dirty="0"/>
+              <a:t> 통일</a:t>
+            </a:r>
+            <a:r>
+              <a:rPr lang="en-US" altLang="ko-KR" sz="1000" dirty="0"/>
+              <a:t>: </a:t>
+            </a:r>
+            <a:r>
+              <a:rPr lang="ko-KR" altLang="en-US" sz="1000" dirty="0">
+                <a:latin typeface="Courier New" panose="02070309020205020404" pitchFamily="49" charset="0"/>
+              </a:rPr>
+              <a:t>* </a:t>
+            </a:r>
+            <a:r>
+              <a:rPr lang="en-US" altLang="ko-KR" sz="1000" dirty="0">
+                <a:latin typeface="Courier New" panose="02070309020205020404" pitchFamily="49" charset="0"/>
+              </a:rPr>
+              <a:t>text=auto </a:t>
+            </a:r>
+            <a:r>
+              <a:rPr lang="en-US" altLang="ko-KR" sz="1000" dirty="0" err="1">
+                <a:latin typeface="Courier New" panose="02070309020205020404" pitchFamily="49" charset="0"/>
+              </a:rPr>
+              <a:t>eol</a:t>
+            </a:r>
+            <a:r>
+              <a:rPr lang="en-US" altLang="ko-KR" sz="1000" dirty="0">
+                <a:latin typeface="Courier New" panose="02070309020205020404" pitchFamily="49" charset="0"/>
+              </a:rPr>
+              <a:t>=</a:t>
+            </a:r>
+            <a:r>
+              <a:rPr lang="en-US" altLang="ko-KR" sz="1000" dirty="0" err="1">
+                <a:latin typeface="Courier New" panose="02070309020205020404" pitchFamily="49" charset="0"/>
+              </a:rPr>
+              <a:t>lf</a:t>
+            </a:r>
+            <a:endParaRPr lang="ko-KR" altLang="en-US" sz="1000" dirty="0"/>
+          </a:p>
+          <a:p>
+            <a:pPr>
+              <a:buFont typeface="+mj-lt"/>
+              <a:buAutoNum type="arabicPeriod"/>
+            </a:pPr>
+            <a:r>
+              <a:rPr lang="ko-KR" altLang="en-US" sz="1000" b="1" dirty="0"/>
+              <a:t>데이터베이스는 별도</a:t>
+            </a:r>
+            <a:endParaRPr lang="ko-KR" altLang="en-US" sz="1000" dirty="0"/>
+          </a:p>
+          <a:p>
+            <a:pPr marL="742950" lvl="1" indent="-285750">
+              <a:buFont typeface="+mj-lt"/>
+              <a:buAutoNum type="arabicPeriod"/>
+            </a:pPr>
+            <a:r>
+              <a:rPr lang="ko-KR" altLang="en-US" sz="1000" dirty="0"/>
+              <a:t>코드 롤백과 </a:t>
+            </a:r>
+            <a:r>
+              <a:rPr lang="en-US" altLang="ko-KR" sz="1000" b="1" dirty="0"/>
+              <a:t>DB </a:t>
+            </a:r>
+            <a:r>
+              <a:rPr lang="ko-KR" altLang="en-US" sz="1000" b="1" dirty="0"/>
+              <a:t>롤백은 별도 문제</a:t>
+            </a:r>
+            <a:r>
+              <a:rPr lang="ko-KR" altLang="en-US" sz="1000" dirty="0"/>
+              <a:t>입니다</a:t>
+            </a:r>
+            <a:r>
+              <a:rPr lang="en-US" altLang="ko-KR" sz="1000" dirty="0"/>
+              <a:t>. Prisma </a:t>
+            </a:r>
+            <a:r>
+              <a:rPr lang="ko-KR" altLang="en-US" sz="1000" dirty="0"/>
+              <a:t>마이그레이션은 </a:t>
+            </a:r>
+            <a:r>
+              <a:rPr lang="en-US" altLang="ko-KR" sz="1000" dirty="0">
+                <a:latin typeface="Courier New" panose="02070309020205020404" pitchFamily="49" charset="0"/>
+              </a:rPr>
+              <a:t>migrate deploy</a:t>
+            </a:r>
+            <a:r>
+              <a:rPr lang="ko-KR" altLang="en-US" sz="1000" dirty="0"/>
+              <a:t> 기준으로 </a:t>
+            </a:r>
+            <a:r>
+              <a:rPr lang="ko-KR" altLang="en-US" sz="1000" b="1" dirty="0"/>
+              <a:t>앞</a:t>
+            </a:r>
+            <a:r>
+              <a:rPr lang="en-US" altLang="ko-KR" sz="1000" b="1" dirty="0"/>
+              <a:t>/</a:t>
+            </a:r>
+            <a:r>
+              <a:rPr lang="ko-KR" altLang="en-US" sz="1000" b="1" dirty="0"/>
+              <a:t>뒤 이동 계획</a:t>
+            </a:r>
+            <a:r>
+              <a:rPr lang="ko-KR" altLang="en-US" sz="1000" dirty="0"/>
+              <a:t>을 문서화하시고</a:t>
+            </a:r>
+            <a:r>
+              <a:rPr lang="en-US" altLang="ko-KR" sz="1000" dirty="0"/>
+              <a:t>, </a:t>
+            </a:r>
+            <a:r>
+              <a:rPr lang="ko-KR" altLang="en-US" sz="1000" dirty="0"/>
+              <a:t>운영 </a:t>
+            </a:r>
+            <a:r>
+              <a:rPr lang="en-US" altLang="ko-KR" sz="1000" dirty="0"/>
+              <a:t>DB</a:t>
+            </a:r>
+            <a:r>
+              <a:rPr lang="ko-KR" altLang="en-US" sz="1000" dirty="0"/>
+              <a:t>는 </a:t>
+            </a:r>
+            <a:r>
+              <a:rPr lang="en-US" altLang="ko-KR" sz="1000" dirty="0"/>
+              <a:t>Neon</a:t>
+            </a:r>
+            <a:r>
+              <a:rPr lang="ko-KR" altLang="en-US" sz="1000" dirty="0"/>
+              <a:t>의 </a:t>
+            </a:r>
+            <a:r>
+              <a:rPr lang="ko-KR" altLang="en-US" sz="1000" b="1" dirty="0"/>
+              <a:t>자동 백업</a:t>
+            </a:r>
+            <a:r>
+              <a:rPr lang="en-US" altLang="ko-KR" sz="1000" b="1" dirty="0"/>
+              <a:t>/</a:t>
+            </a:r>
+            <a:r>
+              <a:rPr lang="ko-KR" altLang="en-US" sz="1000" b="1" dirty="0"/>
+              <a:t>스냅샷</a:t>
+            </a:r>
+            <a:r>
+              <a:rPr lang="ko-KR" altLang="en-US" sz="1000" dirty="0"/>
+              <a:t>을 활성화하십시오</a:t>
+            </a:r>
+            <a:r>
+              <a:rPr lang="en-US" altLang="ko-KR" sz="1000" dirty="0"/>
+              <a:t>.</a:t>
+            </a:r>
+          </a:p>
+          <a:p>
+            <a:pPr>
+              <a:buNone/>
+            </a:pPr>
+            <a:r>
+              <a:rPr lang="ko-KR" altLang="en-US" sz="1000" b="1" dirty="0"/>
+              <a:t>결론</a:t>
+            </a:r>
+          </a:p>
+          <a:p>
+            <a:pPr>
+              <a:buFont typeface="Arial" panose="020B0604020202020204" pitchFamily="34" charset="0"/>
+              <a:buChar char="•"/>
+            </a:pPr>
+            <a:r>
+              <a:rPr lang="ko-KR" altLang="en-US" sz="1000" dirty="0"/>
+              <a:t>폴더 복사 대신 </a:t>
+            </a:r>
+            <a:r>
+              <a:rPr lang="en-US" altLang="ko-KR" sz="1000" b="1" dirty="0"/>
+              <a:t>Git </a:t>
+            </a:r>
+            <a:r>
+              <a:rPr lang="ko-KR" altLang="en-US" sz="1000" b="1" dirty="0" err="1"/>
+              <a:t>브랜치</a:t>
+            </a:r>
+            <a:r>
+              <a:rPr lang="ko-KR" altLang="en-US" sz="1000" b="1" dirty="0"/>
+              <a:t> </a:t>
+            </a:r>
+            <a:r>
+              <a:rPr lang="en-US" altLang="ko-KR" sz="1000" b="1" dirty="0"/>
+              <a:t>+ </a:t>
+            </a:r>
+            <a:r>
+              <a:rPr lang="ko-KR" altLang="en-US" sz="1000" b="1" dirty="0"/>
+              <a:t>태그 </a:t>
+            </a:r>
+            <a:r>
+              <a:rPr lang="en-US" altLang="ko-KR" sz="1000" b="1" dirty="0"/>
+              <a:t>+ PR</a:t>
+            </a:r>
+            <a:r>
+              <a:rPr lang="ko-KR" altLang="en-US" sz="1000" dirty="0"/>
+              <a:t>로 관리하십시오</a:t>
+            </a:r>
+            <a:r>
+              <a:rPr lang="en-US" altLang="ko-KR" sz="1000" dirty="0"/>
+              <a:t>.</a:t>
+            </a:r>
+          </a:p>
+          <a:p>
+            <a:pPr>
+              <a:buFont typeface="Arial" panose="020B0604020202020204" pitchFamily="34" charset="0"/>
+              <a:buChar char="•"/>
+            </a:pPr>
+            <a:r>
+              <a:rPr lang="en-US" altLang="ko-KR" sz="1000" dirty="0"/>
+              <a:t>“</a:t>
+            </a:r>
+            <a:r>
+              <a:rPr lang="ko-KR" altLang="en-US" sz="1000" dirty="0"/>
+              <a:t>망했다” 싶을 때는 </a:t>
+            </a:r>
+            <a:r>
+              <a:rPr lang="en-US" altLang="ko-KR" sz="1000" b="1" dirty="0"/>
+              <a:t>revert</a:t>
+            </a:r>
+            <a:r>
+              <a:rPr lang="ko-KR" altLang="en-US" sz="1000" dirty="0"/>
+              <a:t>가 기본</a:t>
+            </a:r>
+            <a:r>
+              <a:rPr lang="en-US" altLang="ko-KR" sz="1000" dirty="0"/>
+              <a:t>, </a:t>
+            </a:r>
+            <a:r>
+              <a:rPr lang="ko-KR" altLang="en-US" sz="1000" dirty="0"/>
+              <a:t>급하면 </a:t>
+            </a:r>
+            <a:r>
+              <a:rPr lang="en-US" altLang="ko-KR" sz="1000" b="1" dirty="0"/>
+              <a:t>reset + force-push</a:t>
+            </a:r>
+            <a:r>
+              <a:rPr lang="en-US" altLang="ko-KR" sz="1000" dirty="0"/>
+              <a:t>(</a:t>
+            </a:r>
+            <a:r>
+              <a:rPr lang="ko-KR" altLang="en-US" sz="1000" dirty="0"/>
+              <a:t>보호 규칙 해제 필요</a:t>
+            </a:r>
+            <a:r>
+              <a:rPr lang="en-US" altLang="ko-KR" sz="1000" dirty="0"/>
+              <a:t>)</a:t>
+            </a:r>
+            <a:r>
+              <a:rPr lang="ko-KR" altLang="en-US" sz="1000" dirty="0"/>
+              <a:t>를 쓰되 기록</a:t>
+            </a:r>
+            <a:r>
+              <a:rPr lang="en-US" altLang="ko-KR" sz="1000" dirty="0"/>
+              <a:t>/</a:t>
+            </a:r>
+            <a:r>
+              <a:rPr lang="ko-KR" altLang="en-US" sz="1000" dirty="0"/>
+              <a:t>리뷰를 남기세요</a:t>
+            </a:r>
+            <a:r>
+              <a:rPr lang="en-US" altLang="ko-KR" sz="1000" dirty="0"/>
+              <a:t>.</a:t>
+            </a:r>
+          </a:p>
+          <a:p>
+            <a:pPr>
+              <a:buFont typeface="Arial" panose="020B0604020202020204" pitchFamily="34" charset="0"/>
+              <a:buChar char="•"/>
+            </a:pPr>
+            <a:r>
+              <a:rPr lang="ko-KR" altLang="en-US" sz="1000" dirty="0"/>
+              <a:t>배포는 </a:t>
+            </a:r>
+            <a:r>
+              <a:rPr lang="ko-KR" altLang="en-US" sz="1000" b="1" dirty="0"/>
+              <a:t>태그</a:t>
+            </a:r>
+            <a:r>
+              <a:rPr lang="en-US" altLang="ko-KR" sz="1000" b="1" dirty="0"/>
+              <a:t>/</a:t>
+            </a:r>
+            <a:r>
+              <a:rPr lang="ko-KR" altLang="en-US" sz="1000" b="1" dirty="0" err="1"/>
+              <a:t>커밋</a:t>
+            </a:r>
+            <a:r>
+              <a:rPr lang="ko-KR" altLang="en-US" sz="1000" b="1" dirty="0"/>
+              <a:t> 기준</a:t>
+            </a:r>
+            <a:r>
+              <a:rPr lang="ko-KR" altLang="en-US" sz="1000" dirty="0"/>
+              <a:t>으로 </a:t>
+            </a:r>
+            <a:r>
+              <a:rPr lang="ko-KR" altLang="en-US" sz="1000" dirty="0" err="1"/>
+              <a:t>롤백합니다</a:t>
+            </a:r>
+            <a:r>
+              <a:rPr lang="en-US" altLang="ko-KR" sz="1000" dirty="0"/>
+              <a:t>.</a:t>
+            </a:r>
+          </a:p>
+          <a:p>
+            <a:pPr>
+              <a:buNone/>
+            </a:pPr>
+            <a:r>
+              <a:rPr lang="ko-KR" altLang="en-US" sz="1000" dirty="0"/>
+              <a:t>원하시면 지금 프로젝트에 </a:t>
+            </a:r>
+            <a:r>
+              <a:rPr lang="ko-KR" altLang="en-US" sz="1000" b="1" dirty="0"/>
+              <a:t>태그</a:t>
+            </a:r>
+            <a:r>
+              <a:rPr lang="en-US" altLang="ko-KR" sz="1000" b="1" dirty="0"/>
+              <a:t>·</a:t>
+            </a:r>
+            <a:r>
+              <a:rPr lang="ko-KR" altLang="en-US" sz="1000" b="1" dirty="0" err="1"/>
+              <a:t>브랜치</a:t>
+            </a:r>
+            <a:r>
+              <a:rPr lang="ko-KR" altLang="en-US" sz="1000" b="1" dirty="0"/>
+              <a:t> 보호 규칙</a:t>
+            </a:r>
+            <a:r>
+              <a:rPr lang="ko-KR" altLang="en-US" sz="1000" dirty="0"/>
+              <a:t>을 설정하는 절차를 한 단계씩 안내해 드리겠습니다</a:t>
+            </a:r>
+            <a:r>
+              <a:rPr lang="en-US" altLang="ko-KR" sz="1000" dirty="0"/>
+              <a:t>. </a:t>
+            </a:r>
+            <a:r>
+              <a:rPr lang="ko-KR" altLang="en-US" sz="1000" dirty="0" err="1"/>
+              <a:t>디비</a:t>
+            </a:r>
+            <a:endParaRPr lang="ko-KR" altLang="en-US" sz="1000" dirty="0"/>
+          </a:p>
+        </p:txBody>
+      </p:sp>
+      <p:sp>
+        <p:nvSpPr>
+          <p:cNvPr id="10" name="TextBox 9">
+            <a:extLst>
+              <a:ext uri="{FF2B5EF4-FFF2-40B4-BE49-F238E27FC236}">
+                <a16:creationId xmlns:a16="http://schemas.microsoft.com/office/drawing/2014/main" id="{74A2DDA4-9FCE-224A-069F-E1E00B2587F9}"/>
+              </a:ext>
+            </a:extLst>
+          </p:cNvPr>
+          <p:cNvSpPr txBox="1"/>
+          <p:nvPr/>
+        </p:nvSpPr>
+        <p:spPr>
+          <a:xfrm>
+            <a:off x="0" y="0"/>
+            <a:ext cx="6324600" cy="246221"/>
+          </a:xfrm>
+          <a:prstGeom prst="rect">
+            <a:avLst/>
+          </a:prstGeom>
+          <a:noFill/>
+        </p:spPr>
+        <p:txBody>
+          <a:bodyPr wrap="square">
+            <a:spAutoFit/>
+          </a:bodyPr>
+          <a:lstStyle/>
+          <a:p>
+            <a:pPr>
+              <a:buNone/>
+            </a:pPr>
+            <a:r>
+              <a:rPr lang="ko-KR" altLang="en-US" sz="1000"/>
+              <a:t>코드 관리</a:t>
+            </a:r>
+            <a:endParaRPr lang="ko-KR" altLang="en-US" sz="1000" dirty="0"/>
+          </a:p>
+        </p:txBody>
+      </p:sp>
     </p:spTree>
     <p:extLst>
       <p:ext uri="{BB962C8B-B14F-4D97-AF65-F5344CB8AC3E}">

</xml_diff>

<commit_message>
chore(vercel): force canonical www via redirects; env cleanup to AUTH_*
</commit_message>
<xml_diff>
--- a/진행상황.pptx
+++ b/진행상황.pptx
@@ -12,6 +12,7 @@
     <p:sldId id="260" r:id="rId6"/>
     <p:sldId id="262" r:id="rId7"/>
     <p:sldId id="261" r:id="rId8"/>
+    <p:sldId id="263" r:id="rId9"/>
   </p:sldIdLst>
   <p:sldSz cx="6858000" cy="9906000" type="A4"/>
   <p:notesSz cx="6858000" cy="9144000"/>
@@ -9779,7 +9780,7 @@
         </p:nvSpPr>
         <p:spPr>
           <a:xfrm>
-            <a:off x="0" y="1752123"/>
+            <a:off x="0" y="319563"/>
             <a:ext cx="6324600" cy="6401753"/>
           </a:xfrm>
           <a:prstGeom prst="rect">
@@ -11009,10 +11010,9 @@
               <a:buNone/>
             </a:pPr>
             <a:r>
-              <a:rPr lang="ko-KR" altLang="en-US" sz="1000"/>
+              <a:rPr lang="ko-KR" altLang="en-US" sz="1000" dirty="0"/>
               <a:t>코드 관리</a:t>
             </a:r>
-            <a:endParaRPr lang="ko-KR" altLang="en-US" sz="1000" dirty="0"/>
           </a:p>
         </p:txBody>
       </p:sp>
@@ -11020,6 +11020,677 @@
     <p:extLst>
       <p:ext uri="{BB962C8B-B14F-4D97-AF65-F5344CB8AC3E}">
         <p14:creationId xmlns:p14="http://schemas.microsoft.com/office/powerpoint/2010/main" val="4173803168"/>
+      </p:ext>
+    </p:extLst>
+  </p:cSld>
+  <p:clrMapOvr>
+    <a:masterClrMapping/>
+  </p:clrMapOvr>
+</p:sld>
+</file>
+
+<file path=ppt/slides/slide8.xml><?xml version="1.0" encoding="utf-8"?>
+<p:sld xmlns:a="http://schemas.openxmlformats.org/drawingml/2006/main" xmlns:r="http://schemas.openxmlformats.org/officeDocument/2006/relationships" xmlns:p="http://schemas.openxmlformats.org/presentationml/2006/main">
+  <p:cSld>
+    <p:spTree>
+      <p:nvGrpSpPr>
+        <p:cNvPr id="1" name=""/>
+        <p:cNvGrpSpPr/>
+        <p:nvPr/>
+      </p:nvGrpSpPr>
+      <p:grpSpPr>
+        <a:xfrm>
+          <a:off x="0" y="0"/>
+          <a:ext cx="0" cy="0"/>
+          <a:chOff x="0" y="0"/>
+          <a:chExt cx="0" cy="0"/>
+        </a:xfrm>
+      </p:grpSpPr>
+      <p:sp>
+        <p:nvSpPr>
+          <p:cNvPr id="5" name="TextBox 4">
+            <a:extLst>
+              <a:ext uri="{FF2B5EF4-FFF2-40B4-BE49-F238E27FC236}">
+                <a16:creationId xmlns:a16="http://schemas.microsoft.com/office/drawing/2014/main" id="{61C0109B-D3C6-B528-586A-6B5A69AD496A}"/>
+              </a:ext>
+            </a:extLst>
+          </p:cNvPr>
+          <p:cNvSpPr txBox="1"/>
+          <p:nvPr/>
+        </p:nvSpPr>
+        <p:spPr>
+          <a:xfrm>
+            <a:off x="0" y="698808"/>
+            <a:ext cx="6515100" cy="3647152"/>
+          </a:xfrm>
+          <a:prstGeom prst="rect">
+            <a:avLst/>
+          </a:prstGeom>
+          <a:noFill/>
+        </p:spPr>
+        <p:txBody>
+          <a:bodyPr wrap="square">
+            <a:spAutoFit/>
+          </a:bodyPr>
+          <a:lstStyle/>
+          <a:p>
+            <a:pPr>
+              <a:buNone/>
+            </a:pPr>
+            <a:r>
+              <a:rPr lang="en-US" altLang="ko-KR" sz="1100" b="1" dirty="0"/>
+              <a:t>v5 </a:t>
+            </a:r>
+            <a:r>
+              <a:rPr lang="ko-KR" altLang="en-US" sz="1100" b="1" dirty="0"/>
+              <a:t>업그레이드 이후 플랜</a:t>
+            </a:r>
+            <a:r>
+              <a:rPr lang="en-US" altLang="ko-KR" sz="1100" b="1" dirty="0"/>
+              <a:t>(</a:t>
+            </a:r>
+            <a:r>
+              <a:rPr lang="ko-KR" altLang="en-US" sz="1100" b="1" dirty="0" err="1"/>
+              <a:t>하이레벨</a:t>
+            </a:r>
+            <a:r>
+              <a:rPr lang="en-US" altLang="ko-KR" sz="1100" b="1" dirty="0"/>
+              <a:t>)</a:t>
+            </a:r>
+          </a:p>
+          <a:p>
+            <a:pPr>
+              <a:buFont typeface="+mj-lt"/>
+              <a:buAutoNum type="arabicPeriod"/>
+            </a:pPr>
+            <a:r>
+              <a:rPr lang="ko-KR" altLang="en-US" sz="1100" b="1" dirty="0" err="1"/>
+              <a:t>브랜치</a:t>
+            </a:r>
+            <a:r>
+              <a:rPr lang="ko-KR" altLang="en-US" sz="1100" b="1" dirty="0"/>
+              <a:t> 배포 확인 </a:t>
+            </a:r>
+            <a:r>
+              <a:rPr lang="en-US" altLang="ko-KR" sz="1100" b="1" dirty="0"/>
+              <a:t>(Preview QA)</a:t>
+            </a:r>
+            <a:endParaRPr lang="ko-KR" altLang="en-US" sz="1100" dirty="0"/>
+          </a:p>
+          <a:p>
+            <a:pPr marL="742950" lvl="1" indent="-285750">
+              <a:buFont typeface="+mj-lt"/>
+              <a:buAutoNum type="arabicPeriod"/>
+            </a:pPr>
+            <a:r>
+              <a:rPr lang="en-US" altLang="ko-KR" sz="1100" dirty="0" err="1"/>
+              <a:t>Vercel</a:t>
+            </a:r>
+            <a:r>
+              <a:rPr lang="en-US" altLang="ko-KR" sz="1100" dirty="0"/>
+              <a:t> Preview</a:t>
+            </a:r>
+            <a:r>
+              <a:rPr lang="ko-KR" altLang="en-US" sz="1100" dirty="0"/>
+              <a:t>에서 </a:t>
+            </a:r>
+            <a:r>
+              <a:rPr lang="en-US" altLang="ko-KR" sz="1100" dirty="0">
+                <a:latin typeface="Courier New" panose="02070309020205020404" pitchFamily="49" charset="0"/>
+              </a:rPr>
+              <a:t>signup/login/logout</a:t>
+            </a:r>
+            <a:r>
+              <a:rPr lang="en-US" altLang="ko-KR" sz="1100" dirty="0"/>
+              <a:t>·</a:t>
+            </a:r>
+            <a:r>
+              <a:rPr lang="en-US" altLang="ko-KR" sz="1100" dirty="0">
+                <a:latin typeface="Courier New" panose="02070309020205020404" pitchFamily="49" charset="0"/>
+              </a:rPr>
+              <a:t>/</a:t>
+            </a:r>
+            <a:r>
+              <a:rPr lang="en-US" altLang="ko-KR" sz="1100" dirty="0" err="1">
+                <a:latin typeface="Courier New" panose="02070309020205020404" pitchFamily="49" charset="0"/>
+              </a:rPr>
+              <a:t>api</a:t>
+            </a:r>
+            <a:r>
+              <a:rPr lang="en-US" altLang="ko-KR" sz="1100" dirty="0">
+                <a:latin typeface="Courier New" panose="02070309020205020404" pitchFamily="49" charset="0"/>
+              </a:rPr>
+              <a:t>/auth/session</a:t>
+            </a:r>
+            <a:r>
+              <a:rPr lang="en-US" altLang="ko-KR" sz="1100" dirty="0"/>
+              <a:t>·</a:t>
+            </a:r>
+            <a:r>
+              <a:rPr lang="en-US" altLang="ko-KR" sz="1100" dirty="0">
+                <a:latin typeface="Courier New" panose="02070309020205020404" pitchFamily="49" charset="0"/>
+              </a:rPr>
+              <a:t>/my</a:t>
+            </a:r>
+            <a:r>
+              <a:rPr lang="ko-KR" altLang="en-US" sz="1100" dirty="0"/>
+              <a:t> 동작 확인</a:t>
+            </a:r>
+          </a:p>
+          <a:p>
+            <a:pPr marL="742950" lvl="1" indent="-285750">
+              <a:buFont typeface="+mj-lt"/>
+              <a:buAutoNum type="arabicPeriod"/>
+            </a:pPr>
+            <a:r>
+              <a:rPr lang="ko-KR" altLang="en-US" sz="1100" dirty="0"/>
+              <a:t>에러 로그</a:t>
+            </a:r>
+            <a:r>
+              <a:rPr lang="en-US" altLang="ko-KR" sz="1100" dirty="0"/>
+              <a:t>/</a:t>
+            </a:r>
+            <a:r>
+              <a:rPr lang="ko-KR" altLang="en-US" sz="1100" dirty="0"/>
+              <a:t>콘솔 경고 유무만 체크</a:t>
+            </a:r>
+          </a:p>
+          <a:p>
+            <a:pPr>
+              <a:buFont typeface="+mj-lt"/>
+              <a:buAutoNum type="arabicPeriod"/>
+            </a:pPr>
+            <a:r>
+              <a:rPr lang="ko-KR" altLang="en-US" sz="1100" b="1" dirty="0"/>
+              <a:t>정리 </a:t>
+            </a:r>
+            <a:r>
+              <a:rPr lang="en-US" altLang="ko-KR" sz="1100" b="1" dirty="0"/>
+              <a:t>&amp; </a:t>
+            </a:r>
+            <a:r>
+              <a:rPr lang="ko-KR" altLang="en-US" sz="1100" b="1" dirty="0"/>
+              <a:t>문서</a:t>
+            </a:r>
+            <a:endParaRPr lang="ko-KR" altLang="en-US" sz="1100" dirty="0"/>
+          </a:p>
+          <a:p>
+            <a:pPr marL="742950" lvl="1" indent="-285750">
+              <a:buFont typeface="+mj-lt"/>
+              <a:buAutoNum type="arabicPeriod"/>
+            </a:pPr>
+            <a:r>
+              <a:rPr lang="en-US" altLang="ko-KR" sz="1100" dirty="0"/>
+              <a:t>v4 </a:t>
+            </a:r>
+            <a:r>
+              <a:rPr lang="ko-KR" altLang="en-US" sz="1100" dirty="0"/>
+              <a:t>유물 제거</a:t>
+            </a:r>
+            <a:r>
+              <a:rPr lang="en-US" altLang="ko-KR" sz="1100" dirty="0"/>
+              <a:t>/</a:t>
+            </a:r>
+            <a:r>
+              <a:rPr lang="ko-KR" altLang="en-US" sz="1100" dirty="0"/>
+              <a:t>경로 정리</a:t>
+            </a:r>
+            <a:r>
+              <a:rPr lang="en-US" altLang="ko-KR" sz="1100" dirty="0"/>
+              <a:t>(</a:t>
+            </a:r>
+            <a:r>
+              <a:rPr lang="ko-KR" altLang="en-US" sz="1100" dirty="0"/>
+              <a:t>이미 </a:t>
+            </a:r>
+            <a:r>
+              <a:rPr lang="en-US" altLang="ko-KR" sz="1100" dirty="0">
+                <a:latin typeface="Courier New" panose="02070309020205020404" pitchFamily="49" charset="0"/>
+              </a:rPr>
+              <a:t>lib/</a:t>
+            </a:r>
+            <a:r>
+              <a:rPr lang="en-US" altLang="ko-KR" sz="1100" dirty="0" err="1">
+                <a:latin typeface="Courier New" panose="02070309020205020404" pitchFamily="49" charset="0"/>
+              </a:rPr>
+              <a:t>auth.ts</a:t>
+            </a:r>
+            <a:r>
+              <a:rPr lang="ko-KR" altLang="en-US" sz="1100" dirty="0"/>
+              <a:t> 삭제됨</a:t>
+            </a:r>
+            <a:r>
+              <a:rPr lang="en-US" altLang="ko-KR" sz="1100" dirty="0"/>
+              <a:t>)</a:t>
+            </a:r>
+          </a:p>
+          <a:p>
+            <a:pPr marL="742950" lvl="1" indent="-285750">
+              <a:buFont typeface="+mj-lt"/>
+              <a:buAutoNum type="arabicPeriod"/>
+            </a:pPr>
+            <a:r>
+              <a:rPr lang="en-US" altLang="ko-KR" sz="1100" dirty="0"/>
+              <a:t>README/</a:t>
+            </a:r>
+            <a:r>
+              <a:rPr lang="ko-KR" altLang="en-US" sz="1100" dirty="0"/>
+              <a:t>프로젝트 노트</a:t>
+            </a:r>
+            <a:r>
+              <a:rPr lang="en-US" altLang="ko-KR" sz="1100" dirty="0"/>
+              <a:t>: </a:t>
+            </a:r>
+            <a:r>
+              <a:rPr lang="en-US" altLang="ko-KR" sz="1100" dirty="0">
+                <a:latin typeface="Courier New" panose="02070309020205020404" pitchFamily="49" charset="0"/>
+              </a:rPr>
+              <a:t>AUTH_*</a:t>
+            </a:r>
+            <a:r>
+              <a:rPr lang="ko-KR" altLang="en-US" sz="1100" dirty="0"/>
+              <a:t> 변수</a:t>
+            </a:r>
+            <a:r>
+              <a:rPr lang="en-US" altLang="ko-KR" sz="1100" dirty="0"/>
+              <a:t>, </a:t>
+            </a:r>
+            <a:r>
+              <a:rPr lang="en-US" altLang="ko-KR" sz="1100" dirty="0">
+                <a:latin typeface="Courier New" panose="02070309020205020404" pitchFamily="49" charset="0"/>
+              </a:rPr>
+              <a:t>auth()</a:t>
+            </a:r>
+            <a:r>
+              <a:rPr lang="ko-KR" altLang="en-US" sz="1100" dirty="0"/>
+              <a:t> 사용 패턴 명시</a:t>
+            </a:r>
+          </a:p>
+          <a:p>
+            <a:pPr>
+              <a:buFont typeface="+mj-lt"/>
+              <a:buAutoNum type="arabicPeriod"/>
+            </a:pPr>
+            <a:r>
+              <a:rPr lang="ko-KR" altLang="en-US" sz="1100" b="1" dirty="0" err="1"/>
+              <a:t>머지</a:t>
+            </a:r>
+            <a:r>
+              <a:rPr lang="ko-KR" altLang="en-US" sz="1100" b="1" dirty="0"/>
+              <a:t> 전략</a:t>
+            </a:r>
+            <a:endParaRPr lang="ko-KR" altLang="en-US" sz="1100" dirty="0"/>
+          </a:p>
+          <a:p>
+            <a:pPr marL="742950" lvl="1" indent="-285750">
+              <a:buFont typeface="+mj-lt"/>
+              <a:buAutoNum type="arabicPeriod"/>
+            </a:pPr>
+            <a:r>
+              <a:rPr lang="en-US" altLang="ko-KR" sz="1100" dirty="0"/>
+              <a:t>GitHub PR </a:t>
+            </a:r>
+            <a:r>
+              <a:rPr lang="ko-KR" altLang="en-US" sz="1100" dirty="0"/>
+              <a:t>생성 → 간단 </a:t>
+            </a:r>
+            <a:r>
+              <a:rPr lang="en-US" altLang="ko-KR" sz="1100" dirty="0"/>
+              <a:t>QA </a:t>
+            </a:r>
+            <a:r>
+              <a:rPr lang="ko-KR" altLang="en-US" sz="1100" dirty="0"/>
+              <a:t>체크리스트 통과 → </a:t>
+            </a:r>
+            <a:r>
+              <a:rPr lang="en-US" altLang="ko-KR" sz="1100" b="1" dirty="0"/>
+              <a:t>main</a:t>
+            </a:r>
+            <a:r>
+              <a:rPr lang="ko-KR" altLang="en-US" sz="1100" dirty="0"/>
+              <a:t>에 </a:t>
+            </a:r>
+            <a:r>
+              <a:rPr lang="ko-KR" altLang="en-US" sz="1100" dirty="0" err="1"/>
+              <a:t>머지</a:t>
+            </a:r>
+            <a:endParaRPr lang="ko-KR" altLang="en-US" sz="1100" dirty="0"/>
+          </a:p>
+          <a:p>
+            <a:pPr marL="742950" lvl="1" indent="-285750">
+              <a:buFont typeface="+mj-lt"/>
+              <a:buAutoNum type="arabicPeriod"/>
+            </a:pPr>
+            <a:r>
+              <a:rPr lang="ko-KR" altLang="en-US" sz="1100" dirty="0"/>
+              <a:t>문제 시 </a:t>
+            </a:r>
+            <a:r>
+              <a:rPr lang="en-US" altLang="ko-KR" sz="1100" dirty="0" err="1"/>
+              <a:t>Vercel</a:t>
+            </a:r>
+            <a:r>
+              <a:rPr lang="ko-KR" altLang="en-US" sz="1100" dirty="0"/>
+              <a:t>에서 이전 배포로 즉시 롤백</a:t>
+            </a:r>
+          </a:p>
+          <a:p>
+            <a:pPr>
+              <a:buFont typeface="+mj-lt"/>
+              <a:buAutoNum type="arabicPeriod"/>
+            </a:pPr>
+            <a:r>
+              <a:rPr lang="ko-KR" altLang="en-US" sz="1100" b="1" dirty="0"/>
+              <a:t>운영 안정화</a:t>
+            </a:r>
+            <a:endParaRPr lang="ko-KR" altLang="en-US" sz="1100" dirty="0"/>
+          </a:p>
+          <a:p>
+            <a:pPr marL="742950" lvl="1" indent="-285750">
+              <a:buFont typeface="+mj-lt"/>
+              <a:buAutoNum type="arabicPeriod"/>
+            </a:pPr>
+            <a:r>
+              <a:rPr lang="ko-KR" altLang="en-US" sz="1100" dirty="0"/>
+              <a:t>세션 만료</a:t>
+            </a:r>
+            <a:r>
+              <a:rPr lang="en-US" altLang="ko-KR" sz="1100" dirty="0"/>
+              <a:t>/</a:t>
+            </a:r>
+            <a:r>
+              <a:rPr lang="ko-KR" altLang="en-US" sz="1100" dirty="0"/>
+              <a:t>에러 케이스 토스트 문구 정리</a:t>
+            </a:r>
+          </a:p>
+          <a:p>
+            <a:pPr marL="742950" lvl="1" indent="-285750">
+              <a:buFont typeface="+mj-lt"/>
+              <a:buAutoNum type="arabicPeriod"/>
+            </a:pPr>
+            <a:r>
+              <a:rPr lang="en-US" altLang="ko-KR" sz="1100" dirty="0"/>
+              <a:t>Rate limit(</a:t>
+            </a:r>
+            <a:r>
+              <a:rPr lang="ko-KR" altLang="en-US" sz="1100" dirty="0"/>
+              <a:t>회원가입</a:t>
+            </a:r>
+            <a:r>
+              <a:rPr lang="en-US" altLang="ko-KR" sz="1100" dirty="0"/>
+              <a:t>/</a:t>
+            </a:r>
+            <a:r>
+              <a:rPr lang="ko-KR" altLang="en-US" sz="1100" dirty="0"/>
+              <a:t>로그인 </a:t>
+            </a:r>
+            <a:r>
+              <a:rPr lang="en-US" altLang="ko-KR" sz="1100" dirty="0"/>
+              <a:t>API) </a:t>
+            </a:r>
+            <a:r>
+              <a:rPr lang="ko-KR" altLang="en-US" sz="1100" dirty="0"/>
+              <a:t>가벼운 적용</a:t>
+            </a:r>
+          </a:p>
+          <a:p>
+            <a:pPr>
+              <a:buFont typeface="+mj-lt"/>
+              <a:buAutoNum type="arabicPeriod"/>
+            </a:pPr>
+            <a:r>
+              <a:rPr lang="ko-KR" altLang="en-US" sz="1100" b="1" dirty="0"/>
+              <a:t>기능 확장</a:t>
+            </a:r>
+            <a:r>
+              <a:rPr lang="en-US" altLang="ko-KR" sz="1100" b="1" dirty="0"/>
+              <a:t>(</a:t>
+            </a:r>
+            <a:r>
+              <a:rPr lang="ko-KR" altLang="en-US" sz="1100" b="1" dirty="0"/>
+              <a:t>다음 스프린트</a:t>
+            </a:r>
+            <a:r>
+              <a:rPr lang="en-US" altLang="ko-KR" sz="1100" b="1" dirty="0"/>
+              <a:t>)</a:t>
+            </a:r>
+            <a:endParaRPr lang="ko-KR" altLang="en-US" sz="1100" dirty="0"/>
+          </a:p>
+          <a:p>
+            <a:pPr marL="742950" lvl="1" indent="-285750">
+              <a:buFont typeface="+mj-lt"/>
+              <a:buAutoNum type="arabicPeriod"/>
+            </a:pPr>
+            <a:r>
+              <a:rPr lang="en-US" altLang="ko-KR" sz="1100" dirty="0">
+                <a:latin typeface="Courier New" panose="02070309020205020404" pitchFamily="49" charset="0"/>
+              </a:rPr>
+              <a:t>/my</a:t>
+            </a:r>
+            <a:r>
+              <a:rPr lang="ko-KR" altLang="en-US" sz="1100" dirty="0"/>
+              <a:t>에 “내 활동” 붙이기</a:t>
+            </a:r>
+            <a:r>
+              <a:rPr lang="en-US" altLang="ko-KR" sz="1100" dirty="0"/>
+              <a:t>: </a:t>
+            </a:r>
+            <a:r>
+              <a:rPr lang="en-US" altLang="ko-KR" sz="1100" b="1" dirty="0" err="1"/>
+              <a:t>UserEntry</a:t>
+            </a:r>
+            <a:r>
+              <a:rPr lang="en-US" altLang="ko-KR" sz="1100" b="1" dirty="0"/>
+              <a:t>(</a:t>
+            </a:r>
+            <a:r>
+              <a:rPr lang="ko-KR" altLang="en-US" sz="1100" b="1" dirty="0"/>
+              <a:t>평점</a:t>
+            </a:r>
+            <a:r>
+              <a:rPr lang="en-US" altLang="ko-KR" sz="1100" b="1" dirty="0"/>
+              <a:t>+</a:t>
+            </a:r>
+            <a:r>
+              <a:rPr lang="ko-KR" altLang="en-US" sz="1100" b="1" dirty="0" err="1"/>
+              <a:t>한줄평</a:t>
+            </a:r>
+            <a:r>
+              <a:rPr lang="en-US" altLang="ko-KR" sz="1100" b="1" dirty="0"/>
+              <a:t>) </a:t>
+            </a:r>
+            <a:r>
+              <a:rPr lang="ko-KR" altLang="en-US" sz="1100" b="1" dirty="0"/>
+              <a:t>테이블</a:t>
+            </a:r>
+            <a:r>
+              <a:rPr lang="ko-KR" altLang="en-US" sz="1100" dirty="0"/>
+              <a:t> 도입</a:t>
+            </a:r>
+            <a:r>
+              <a:rPr lang="en-US" altLang="ko-KR" sz="1100" dirty="0"/>
+              <a:t>(MVP)</a:t>
+            </a:r>
+          </a:p>
+          <a:p>
+            <a:pPr marL="742950" lvl="1" indent="-285750">
+              <a:buFont typeface="+mj-lt"/>
+              <a:buAutoNum type="arabicPeriod"/>
+            </a:pPr>
+            <a:r>
+              <a:rPr lang="en-US" altLang="ko-KR" sz="1100" dirty="0"/>
+              <a:t>“</a:t>
+            </a:r>
+            <a:r>
+              <a:rPr lang="ko-KR" altLang="en-US" sz="1100" dirty="0"/>
+              <a:t>찜</a:t>
+            </a:r>
+            <a:r>
+              <a:rPr lang="en-US" altLang="ko-KR" sz="1100" dirty="0"/>
+              <a:t>/</a:t>
+            </a:r>
+            <a:r>
+              <a:rPr lang="ko-KR" altLang="en-US" sz="1100" dirty="0"/>
+              <a:t>북마크” 스키마로 </a:t>
+            </a:r>
+            <a:r>
+              <a:rPr lang="en-US" altLang="ko-KR" sz="1100" b="1" dirty="0"/>
+              <a:t>Timetable </a:t>
+            </a:r>
+            <a:r>
+              <a:rPr lang="ko-KR" altLang="en-US" sz="1100" b="1" dirty="0"/>
+              <a:t>프리뷰</a:t>
+            </a:r>
+            <a:r>
+              <a:rPr lang="ko-KR" altLang="en-US" sz="1100" dirty="0"/>
+              <a:t> 표시</a:t>
+            </a:r>
+          </a:p>
+          <a:p>
+            <a:pPr>
+              <a:buFont typeface="+mj-lt"/>
+              <a:buAutoNum type="arabicPeriod"/>
+            </a:pPr>
+            <a:r>
+              <a:rPr lang="ko-KR" altLang="en-US" sz="1100" b="1" dirty="0"/>
+              <a:t>성능</a:t>
+            </a:r>
+            <a:r>
+              <a:rPr lang="en-US" altLang="ko-KR" sz="1100" b="1" dirty="0"/>
+              <a:t>/UX </a:t>
+            </a:r>
+            <a:r>
+              <a:rPr lang="ko-KR" altLang="en-US" sz="1100" b="1" dirty="0"/>
+              <a:t>개선</a:t>
+            </a:r>
+            <a:r>
+              <a:rPr lang="en-US" altLang="ko-KR" sz="1100" b="1" dirty="0"/>
+              <a:t>(</a:t>
+            </a:r>
+            <a:r>
+              <a:rPr lang="ko-KR" altLang="en-US" sz="1100" b="1" dirty="0" err="1"/>
+              <a:t>백로그</a:t>
+            </a:r>
+            <a:r>
+              <a:rPr lang="en-US" altLang="ko-KR" sz="1100" b="1" dirty="0"/>
+              <a:t>)</a:t>
+            </a:r>
+            <a:endParaRPr lang="ko-KR" altLang="en-US" sz="1100" dirty="0"/>
+          </a:p>
+          <a:p>
+            <a:pPr marL="742950" lvl="1" indent="-285750">
+              <a:buFont typeface="+mj-lt"/>
+              <a:buAutoNum type="arabicPeriod"/>
+            </a:pPr>
+            <a:r>
+              <a:rPr lang="ko-KR" altLang="en-US" sz="1100" dirty="0" err="1"/>
+              <a:t>콜드스타트</a:t>
+            </a:r>
+            <a:r>
+              <a:rPr lang="en-US" altLang="ko-KR" sz="1100" dirty="0"/>
+              <a:t>/</a:t>
+            </a:r>
+            <a:r>
+              <a:rPr lang="ko-KR" altLang="en-US" sz="1100" dirty="0"/>
+              <a:t>네트워크 지연 완화 모니터링</a:t>
+            </a:r>
+          </a:p>
+          <a:p>
+            <a:pPr marL="742950" lvl="1" indent="-285750">
+              <a:buFont typeface="+mj-lt"/>
+              <a:buAutoNum type="arabicPeriod"/>
+            </a:pPr>
+            <a:r>
+              <a:rPr lang="ko-KR" altLang="en-US" sz="1100" dirty="0"/>
+              <a:t>로그인 성공 시 </a:t>
+            </a:r>
+            <a:r>
+              <a:rPr lang="ko-KR" altLang="en-US" sz="1100" dirty="0" err="1"/>
+              <a:t>구해시</a:t>
+            </a:r>
+            <a:r>
+              <a:rPr lang="ko-KR" altLang="en-US" sz="1100" dirty="0"/>
+              <a:t> → 신해시로 </a:t>
+            </a:r>
+            <a:r>
+              <a:rPr lang="ko-KR" altLang="en-US" sz="1100" b="1" dirty="0"/>
+              <a:t>자동 </a:t>
+            </a:r>
+            <a:r>
+              <a:rPr lang="ko-KR" altLang="en-US" sz="1100" b="1" dirty="0" err="1"/>
+              <a:t>재해시</a:t>
+            </a:r>
+            <a:r>
+              <a:rPr lang="en-US" altLang="ko-KR" sz="1100" dirty="0"/>
+              <a:t>(</a:t>
+            </a:r>
+            <a:r>
+              <a:rPr lang="ko-KR" altLang="en-US" sz="1100" dirty="0"/>
+              <a:t>점진적</a:t>
+            </a:r>
+            <a:r>
+              <a:rPr lang="en-US" altLang="ko-KR" sz="1100" dirty="0"/>
+              <a:t>)</a:t>
+            </a:r>
+          </a:p>
+          <a:p>
+            <a:pPr marL="742950" lvl="1" indent="-285750">
+              <a:buFont typeface="+mj-lt"/>
+              <a:buAutoNum type="arabicPeriod"/>
+            </a:pPr>
+            <a:r>
+              <a:rPr lang="ko-KR" altLang="en-US" sz="1100" dirty="0"/>
+              <a:t>전역 로딩 피드백</a:t>
+            </a:r>
+            <a:r>
+              <a:rPr lang="en-US" altLang="ko-KR" sz="1100" dirty="0"/>
+              <a:t>/</a:t>
+            </a:r>
+            <a:r>
+              <a:rPr lang="ko-KR" altLang="en-US" sz="1100" dirty="0"/>
+              <a:t>낙관적 </a:t>
+            </a:r>
+            <a:r>
+              <a:rPr lang="en-US" altLang="ko-KR" sz="1100" dirty="0"/>
+              <a:t>UI </a:t>
+            </a:r>
+            <a:r>
+              <a:rPr lang="ko-KR" altLang="en-US" sz="1100" dirty="0"/>
+              <a:t>미세 개선</a:t>
+            </a:r>
+          </a:p>
+          <a:p>
+            <a:pPr>
+              <a:buNone/>
+            </a:pPr>
+            <a:r>
+              <a:rPr lang="ko-KR" altLang="en-US" sz="1100" dirty="0"/>
+              <a:t>원하시면 지금 </a:t>
+            </a:r>
+            <a:r>
+              <a:rPr lang="en-US" altLang="ko-KR" sz="1100" b="1" dirty="0"/>
+              <a:t>1) Preview QA</a:t>
+            </a:r>
+            <a:r>
+              <a:rPr lang="ko-KR" altLang="en-US" sz="1100" dirty="0"/>
+              <a:t>부터 진행하겠습니다</a:t>
+            </a:r>
+            <a:r>
+              <a:rPr lang="en-US" altLang="ko-KR" sz="1100" dirty="0"/>
+              <a:t>. </a:t>
+            </a:r>
+            <a:r>
+              <a:rPr lang="ko-KR" altLang="en-US" sz="1100" dirty="0" err="1"/>
+              <a:t>디비</a:t>
+            </a:r>
+            <a:endParaRPr lang="ko-KR" altLang="en-US" sz="1100" dirty="0"/>
+          </a:p>
+        </p:txBody>
+      </p:sp>
+    </p:spTree>
+    <p:extLst>
+      <p:ext uri="{BB962C8B-B14F-4D97-AF65-F5344CB8AC3E}">
+        <p14:creationId xmlns:p14="http://schemas.microsoft.com/office/powerpoint/2010/main" val="234893960"/>
       </p:ext>
     </p:extLst>
   </p:cSld>

</xml_diff>